<commit_message>
Fixed some figures and definitions.
</commit_message>
<xml_diff>
--- a/figures/res-type-def-ex.pptx
+++ b/figures/res-type-def-ex.pptx
@@ -259,7 +259,7 @@
           <a:p>
             <a:fld id="{1A30122B-BC72-41F7-938E-33D4221D7AF9}" type="datetimeFigureOut">
               <a:rPr lang="en-US" smtClean="0"/>
-              <a:t>6/16/2025</a:t>
+              <a:t>6/18/2025</a:t>
             </a:fld>
             <a:endParaRPr lang="en-US"/>
           </a:p>
@@ -457,7 +457,7 @@
           <a:p>
             <a:fld id="{1A30122B-BC72-41F7-938E-33D4221D7AF9}" type="datetimeFigureOut">
               <a:rPr lang="en-US" smtClean="0"/>
-              <a:t>6/16/2025</a:t>
+              <a:t>6/18/2025</a:t>
             </a:fld>
             <a:endParaRPr lang="en-US"/>
           </a:p>
@@ -665,7 +665,7 @@
           <a:p>
             <a:fld id="{1A30122B-BC72-41F7-938E-33D4221D7AF9}" type="datetimeFigureOut">
               <a:rPr lang="en-US" smtClean="0"/>
-              <a:t>6/16/2025</a:t>
+              <a:t>6/18/2025</a:t>
             </a:fld>
             <a:endParaRPr lang="en-US"/>
           </a:p>
@@ -863,7 +863,7 @@
           <a:p>
             <a:fld id="{1A30122B-BC72-41F7-938E-33D4221D7AF9}" type="datetimeFigureOut">
               <a:rPr lang="en-US" smtClean="0"/>
-              <a:t>6/16/2025</a:t>
+              <a:t>6/18/2025</a:t>
             </a:fld>
             <a:endParaRPr lang="en-US"/>
           </a:p>
@@ -1138,7 +1138,7 @@
           <a:p>
             <a:fld id="{1A30122B-BC72-41F7-938E-33D4221D7AF9}" type="datetimeFigureOut">
               <a:rPr lang="en-US" smtClean="0"/>
-              <a:t>6/16/2025</a:t>
+              <a:t>6/18/2025</a:t>
             </a:fld>
             <a:endParaRPr lang="en-US"/>
           </a:p>
@@ -1403,7 +1403,7 @@
           <a:p>
             <a:fld id="{1A30122B-BC72-41F7-938E-33D4221D7AF9}" type="datetimeFigureOut">
               <a:rPr lang="en-US" smtClean="0"/>
-              <a:t>6/16/2025</a:t>
+              <a:t>6/18/2025</a:t>
             </a:fld>
             <a:endParaRPr lang="en-US"/>
           </a:p>
@@ -1815,7 +1815,7 @@
           <a:p>
             <a:fld id="{1A30122B-BC72-41F7-938E-33D4221D7AF9}" type="datetimeFigureOut">
               <a:rPr lang="en-US" smtClean="0"/>
-              <a:t>6/16/2025</a:t>
+              <a:t>6/18/2025</a:t>
             </a:fld>
             <a:endParaRPr lang="en-US"/>
           </a:p>
@@ -1956,7 +1956,7 @@
           <a:p>
             <a:fld id="{1A30122B-BC72-41F7-938E-33D4221D7AF9}" type="datetimeFigureOut">
               <a:rPr lang="en-US" smtClean="0"/>
-              <a:t>6/16/2025</a:t>
+              <a:t>6/18/2025</a:t>
             </a:fld>
             <a:endParaRPr lang="en-US"/>
           </a:p>
@@ -2069,7 +2069,7 @@
           <a:p>
             <a:fld id="{1A30122B-BC72-41F7-938E-33D4221D7AF9}" type="datetimeFigureOut">
               <a:rPr lang="en-US" smtClean="0"/>
-              <a:t>6/16/2025</a:t>
+              <a:t>6/18/2025</a:t>
             </a:fld>
             <a:endParaRPr lang="en-US"/>
           </a:p>
@@ -2380,7 +2380,7 @@
           <a:p>
             <a:fld id="{1A30122B-BC72-41F7-938E-33D4221D7AF9}" type="datetimeFigureOut">
               <a:rPr lang="en-US" smtClean="0"/>
-              <a:t>6/16/2025</a:t>
+              <a:t>6/18/2025</a:t>
             </a:fld>
             <a:endParaRPr lang="en-US"/>
           </a:p>
@@ -2668,7 +2668,7 @@
           <a:p>
             <a:fld id="{1A30122B-BC72-41F7-938E-33D4221D7AF9}" type="datetimeFigureOut">
               <a:rPr lang="en-US" smtClean="0"/>
-              <a:t>6/16/2025</a:t>
+              <a:t>6/18/2025</a:t>
             </a:fld>
             <a:endParaRPr lang="en-US"/>
           </a:p>
@@ -2909,7 +2909,7 @@
           <a:p>
             <a:fld id="{1A30122B-BC72-41F7-938E-33D4221D7AF9}" type="datetimeFigureOut">
               <a:rPr lang="en-US" smtClean="0"/>
-              <a:t>6/16/2025</a:t>
+              <a:t>6/18/2025</a:t>
             </a:fld>
             <a:endParaRPr lang="en-US"/>
           </a:p>
@@ -3610,7 +3610,7 @@
         <p:spPr>
           <a:xfrm>
             <a:off x="2382110" y="1596492"/>
-            <a:ext cx="934871" cy="261610"/>
+            <a:ext cx="851515" cy="261610"/>
           </a:xfrm>
           <a:prstGeom prst="rect">
             <a:avLst/>
@@ -3629,7 +3629,7 @@
                 <a:ea typeface="Cascadia Mono Light" panose="020B0609020000020004" pitchFamily="49" charset="0"/>
                 <a:cs typeface="Cascadia Mono Light" panose="020B0609020000020004" pitchFamily="49" charset="0"/>
               </a:rPr>
-              <a:t>res_types</a:t>
+              <a:t>res_type</a:t>
             </a:r>
             <a:endParaRPr lang="en-US" sz="1100" dirty="0">
               <a:latin typeface="Cascadia Mono Light" panose="020B0609020000020004" pitchFamily="49" charset="0"/>

</xml_diff>